<commit_message>
Added slide to powerpoint with link to repo
</commit_message>
<xml_diff>
--- a/session04/11_1_18_SC2_ML_with_SKlearn_workshop_slides.pptx
+++ b/session04/11_1_18_SC2_ML_with_SKlearn_workshop_slides.pptx
@@ -5,7 +5,7 @@
     <p:sldMasterId id="2147483648" r:id="rId1"/>
   </p:sldMasterIdLst>
   <p:notesMasterIdLst>
-    <p:notesMasterId r:id="rId16"/>
+    <p:notesMasterId r:id="rId17"/>
   </p:notesMasterIdLst>
   <p:sldIdLst>
     <p:sldId id="256" r:id="rId2"/>
@@ -21,7 +21,8 @@
     <p:sldId id="269" r:id="rId12"/>
     <p:sldId id="270" r:id="rId13"/>
     <p:sldId id="264" r:id="rId14"/>
-    <p:sldId id="265" r:id="rId15"/>
+    <p:sldId id="271" r:id="rId15"/>
+    <p:sldId id="265" r:id="rId16"/>
   </p:sldIdLst>
   <p:sldSz cx="9144000" cy="5143500" type="screen16x9"/>
   <p:notesSz cx="6858000" cy="9144000"/>
@@ -4265,8 +4266,8 @@
         </p:blipFill>
         <p:spPr>
           <a:xfrm>
-            <a:off x="2393900" y="3327188"/>
-            <a:ext cx="3657600" cy="609600"/>
+            <a:off x="2393900" y="3327187"/>
+            <a:ext cx="3657600" cy="706169"/>
           </a:xfrm>
           <a:prstGeom prst="rect">
             <a:avLst/>
@@ -4289,8 +4290,8 @@
         </p:blipFill>
         <p:spPr>
           <a:xfrm>
-            <a:off x="2775922" y="4405314"/>
-            <a:ext cx="2667000" cy="361950"/>
+            <a:off x="2775922" y="4405313"/>
+            <a:ext cx="2667000" cy="461187"/>
           </a:xfrm>
           <a:prstGeom prst="rect">
             <a:avLst/>
@@ -4694,8 +4695,8 @@
         </p:blipFill>
         <p:spPr>
           <a:xfrm>
-            <a:off x="2525486" y="4315531"/>
-            <a:ext cx="2895600" cy="628650"/>
+            <a:off x="2525486" y="4110922"/>
+            <a:ext cx="2895600" cy="833259"/>
           </a:xfrm>
           <a:prstGeom prst="rect">
             <a:avLst/>
@@ -5167,8 +5168,8 @@
         </p:blipFill>
         <p:spPr>
           <a:xfrm>
-            <a:off x="2269672" y="2621061"/>
-            <a:ext cx="4483100" cy="933450"/>
+            <a:off x="2269672" y="2621060"/>
+            <a:ext cx="4483100" cy="1131125"/>
           </a:xfrm>
           <a:prstGeom prst="rect">
             <a:avLst/>
@@ -5191,8 +5192,8 @@
         </p:blipFill>
         <p:spPr>
           <a:xfrm>
-            <a:off x="511629" y="4197495"/>
-            <a:ext cx="7594600" cy="590550"/>
+            <a:off x="794919" y="4091531"/>
+            <a:ext cx="7311309" cy="696514"/>
           </a:xfrm>
           <a:prstGeom prst="rect">
             <a:avLst/>
@@ -5316,6 +5317,93 @@
 </file>
 
 <file path=ppt/slides/slide14.xml><?xml version="1.0" encoding="utf-8"?>
+<p:sld xmlns:a="http://schemas.openxmlformats.org/drawingml/2006/main" xmlns:r="http://schemas.openxmlformats.org/officeDocument/2006/relationships" xmlns:p="http://schemas.openxmlformats.org/presentationml/2006/main">
+  <p:cSld>
+    <p:spTree>
+      <p:nvGrpSpPr>
+        <p:cNvPr id="1" name=""/>
+        <p:cNvGrpSpPr/>
+        <p:nvPr/>
+      </p:nvGrpSpPr>
+      <p:grpSpPr>
+        <a:xfrm>
+          <a:off x="0" y="0"/>
+          <a:ext cx="0" cy="0"/>
+          <a:chOff x="0" y="0"/>
+          <a:chExt cx="0" cy="0"/>
+        </a:xfrm>
+      </p:grpSpPr>
+      <p:sp>
+        <p:nvSpPr>
+          <p:cNvPr id="2" name="Title 1"/>
+          <p:cNvSpPr>
+            <a:spLocks noGrp="1"/>
+          </p:cNvSpPr>
+          <p:nvPr>
+            <p:ph type="title"/>
+          </p:nvPr>
+        </p:nvSpPr>
+        <p:spPr/>
+        <p:txBody>
+          <a:bodyPr/>
+          <a:lstStyle/>
+          <a:p>
+            <a:r>
+              <a:rPr lang="en-US" dirty="0" smtClean="0"/>
+              <a:t>Hands On Practice</a:t>
+            </a:r>
+            <a:endParaRPr lang="en-US" dirty="0"/>
+          </a:p>
+        </p:txBody>
+      </p:sp>
+      <p:sp>
+        <p:nvSpPr>
+          <p:cNvPr id="3" name="Content Placeholder 2"/>
+          <p:cNvSpPr>
+            <a:spLocks noGrp="1"/>
+          </p:cNvSpPr>
+          <p:nvPr>
+            <p:ph idx="1"/>
+          </p:nvPr>
+        </p:nvSpPr>
+        <p:spPr/>
+        <p:txBody>
+          <a:bodyPr/>
+          <a:lstStyle/>
+          <a:p>
+            <a:r>
+              <a:rPr lang="en-US" dirty="0" err="1" smtClean="0"/>
+              <a:t>git</a:t>
+            </a:r>
+            <a:r>
+              <a:rPr lang="en-US" dirty="0"/>
+              <a:t> clone https://</a:t>
+            </a:r>
+            <a:r>
+              <a:rPr lang="en-US" dirty="0" err="1"/>
+              <a:t>github.com</a:t>
+            </a:r>
+            <a:r>
+              <a:rPr lang="en-US" dirty="0"/>
+              <a:t>/UM-SC2/HPC-DS-workshop-2018.git</a:t>
+            </a:r>
+          </a:p>
+        </p:txBody>
+      </p:sp>
+    </p:spTree>
+    <p:extLst>
+      <p:ext uri="{BB962C8B-B14F-4D97-AF65-F5344CB8AC3E}">
+        <p14:creationId xmlns:p14="http://schemas.microsoft.com/office/powerpoint/2010/main" val="4206574070"/>
+      </p:ext>
+    </p:extLst>
+  </p:cSld>
+  <p:clrMapOvr>
+    <a:masterClrMapping/>
+  </p:clrMapOvr>
+</p:sld>
+</file>
+
+<file path=ppt/slides/slide15.xml><?xml version="1.0" encoding="utf-8"?>
 <p:sld xmlns:a="http://schemas.openxmlformats.org/drawingml/2006/main" xmlns:r="http://schemas.openxmlformats.org/officeDocument/2006/relationships" xmlns:p="http://schemas.openxmlformats.org/presentationml/2006/main">
   <p:cSld>
     <p:spTree>
@@ -5583,6 +5671,13 @@
   <p:clrMapOvr>
     <a:masterClrMapping/>
   </p:clrMapOvr>
+  <p:timing>
+    <p:tnLst>
+      <p:par>
+        <p:cTn xmlns:p14="http://schemas.microsoft.com/office/powerpoint/2010/main" id="1" dur="indefinite" restart="never" nodeType="tmRoot"/>
+      </p:par>
+    </p:tnLst>
+  </p:timing>
 </p:sld>
 </file>
 
@@ -5769,6 +5864,13 @@
   <p:clrMapOvr>
     <a:masterClrMapping/>
   </p:clrMapOvr>
+  <p:timing>
+    <p:tnLst>
+      <p:par>
+        <p:cTn xmlns:p14="http://schemas.microsoft.com/office/powerpoint/2010/main" id="1" dur="indefinite" restart="never" nodeType="tmRoot"/>
+      </p:par>
+    </p:tnLst>
+  </p:timing>
 </p:sld>
 </file>
 
@@ -5820,7 +5922,7 @@
         </p:nvGrpSpPr>
         <p:grpSpPr>
           <a:xfrm>
-            <a:off x="0" y="1049625"/>
+            <a:off x="-29082" y="1049625"/>
             <a:ext cx="5990350" cy="3695393"/>
             <a:chOff x="490700" y="1187238"/>
             <a:chExt cx="8547100" cy="3695393"/>
@@ -7661,8 +7763,8 @@
           </p:nvSpPr>
           <p:spPr>
             <a:xfrm>
-              <a:off x="2502900" y="2647188"/>
-              <a:ext cx="775500" cy="775500"/>
+              <a:off x="2502899" y="2647188"/>
+              <a:ext cx="775501" cy="775500"/>
             </a:xfrm>
             <a:prstGeom prst="rect">
               <a:avLst/>
@@ -7720,7 +7822,7 @@
           <p:spPr>
             <a:xfrm>
               <a:off x="5236850" y="2633675"/>
-              <a:ext cx="775500" cy="775500"/>
+              <a:ext cx="775501" cy="775500"/>
             </a:xfrm>
             <a:prstGeom prst="rect">
               <a:avLst/>
@@ -7973,7 +8075,7 @@
         </p:blipFill>
         <p:spPr>
           <a:xfrm>
-            <a:off x="5949050" y="1184342"/>
+            <a:off x="5919968" y="1184342"/>
             <a:ext cx="3153650" cy="3731650"/>
           </a:xfrm>
           <a:prstGeom prst="rect">
@@ -13184,7 +13286,7 @@
         <p:spPr>
           <a:xfrm>
             <a:off x="351047" y="122244"/>
-            <a:ext cx="8249606" cy="4275746"/>
+            <a:ext cx="8249606" cy="4443662"/>
           </a:xfrm>
           <a:prstGeom prst="rect">
             <a:avLst/>
@@ -13510,21 +13612,9 @@
             </a:r>
           </a:p>
           <a:p>
-            <a:endParaRPr lang="en-US" sz="2400" dirty="0"/>
-          </a:p>
-          <a:p>
-            <a:endParaRPr lang="en-US" sz="2400" dirty="0" smtClean="0"/>
-          </a:p>
-          <a:p>
             <a:pPr marL="0" indent="0">
               <a:buNone/>
             </a:pPr>
-            <a:endParaRPr lang="en-US" sz="2400" dirty="0" smtClean="0"/>
-          </a:p>
-          <a:p>
-            <a:endParaRPr lang="en-US" sz="2400" dirty="0" smtClean="0"/>
-          </a:p>
-          <a:p>
             <a:endParaRPr lang="en-US" sz="2400" dirty="0" smtClean="0"/>
           </a:p>
           <a:p>
@@ -13582,8 +13672,8 @@
         </p:blipFill>
         <p:spPr>
           <a:xfrm>
-            <a:off x="5098143" y="1593882"/>
-            <a:ext cx="2492829" cy="647700"/>
+            <a:off x="5098143" y="1487231"/>
+            <a:ext cx="2492829" cy="800924"/>
           </a:xfrm>
           <a:prstGeom prst="rect">
             <a:avLst/>
@@ -13606,8 +13696,8 @@
         </p:blipFill>
         <p:spPr>
           <a:xfrm>
-            <a:off x="2811814" y="2985897"/>
-            <a:ext cx="2844800" cy="609600"/>
+            <a:off x="2811814" y="2985896"/>
+            <a:ext cx="2844800" cy="766289"/>
           </a:xfrm>
           <a:prstGeom prst="rect">
             <a:avLst/>
@@ -13630,8 +13720,8 @@
         </p:blipFill>
         <p:spPr>
           <a:xfrm>
-            <a:off x="1503714" y="4303940"/>
-            <a:ext cx="2616200" cy="552450"/>
+            <a:off x="1503714" y="4188486"/>
+            <a:ext cx="2616200" cy="667904"/>
           </a:xfrm>
           <a:prstGeom prst="rect">
             <a:avLst/>
@@ -13654,8 +13744,8 @@
         </p:blipFill>
         <p:spPr>
           <a:xfrm>
-            <a:off x="4321628" y="4433133"/>
-            <a:ext cx="2641600" cy="266700"/>
+            <a:off x="4321628" y="4377397"/>
+            <a:ext cx="2641600" cy="322436"/>
           </a:xfrm>
           <a:prstGeom prst="rect">
             <a:avLst/>

</xml_diff>